<commit_message>
4 - In class updates.
</commit_message>
<xml_diff>
--- a/Presentations/2018-10-01 - Event and Media.pptx
+++ b/Presentations/2018-10-01 - Event and Media.pptx
@@ -4203,7 +4203,7 @@
           <a:p>
             <a:r>
               <a:rPr lang="en-US" sz="3200" b="1"/>
-              <a:t>https://postimg.cc/gallery/2wrxm8h9w/</a:t>
+              <a:t>https://tinyurl.com/IMM120memes</a:t>
             </a:r>
           </a:p>
         </p:txBody>
@@ -9363,6 +9363,12 @@
             <a:r>
               <a:rPr lang="en-US"/>
               <a:t>textAlign(CENTER, CENTER);</a:t>
+            </a:r>
+          </a:p>
+          <a:p>
+            <a:r>
+              <a:rPr lang="en-US"/>
+              <a:t>fill(r, g, b);</a:t>
             </a:r>
           </a:p>
           <a:p>

</xml_diff>